<commit_message>
mise à jour de la progression en tenant compte des contraintes 2024-25
</commit_message>
<xml_diff>
--- a/01_python/cours/Memo Python V1.pptx
+++ b/01_python/cours/Memo Python V1.pptx
@@ -1608,14 +1608,14 @@
           <a:effectLst/>
           <a:extLst>
             <a:ext uri="{909E8E84-426E-40dd-AFC4-6F175D3DCCD1}">
-              <a14:hiddenFill xmlns="" xmlns:a14="http://schemas.microsoft.com/office/drawing/2010/main">
+              <a14:hiddenFill xmlns:a14="http://schemas.microsoft.com/office/drawing/2010/main" xmlns="">
                 <a:solidFill>
                   <a:schemeClr val="accent1"/>
                 </a:solidFill>
               </a14:hiddenFill>
             </a:ext>
             <a:ext uri="{91240B29-F687-4f45-9708-019B960494DF}">
-              <a14:hiddenLine xmlns="" xmlns:a14="http://schemas.microsoft.com/office/drawing/2010/main" w="9525">
+              <a14:hiddenLine xmlns:a14="http://schemas.microsoft.com/office/drawing/2010/main" xmlns="" w="9525">
                 <a:solidFill>
                   <a:schemeClr val="tx1"/>
                 </a:solidFill>
@@ -1625,7 +1625,7 @@
               </a14:hiddenLine>
             </a:ext>
             <a:ext uri="{AF507438-7753-43e0-B8FC-AC1667EBCBE1}">
-              <a14:hiddenEffects xmlns="" xmlns:a14="http://schemas.microsoft.com/office/drawing/2010/main">
+              <a14:hiddenEffects xmlns:a14="http://schemas.microsoft.com/office/drawing/2010/main" xmlns="">
                 <a:effectLst>
                   <a:outerShdw blurRad="63500" dist="38099" dir="2700000" algn="ctr" rotWithShape="0">
                     <a:schemeClr val="bg2">
@@ -1636,7 +1636,7 @@
               </a14:hiddenEffects>
             </a:ext>
             <a:ext uri="{FAA26D3D-D897-4be2-8F04-BA451C77F1D7}">
-              <ma14:placeholderFlag xmlns="" xmlns:ma14="http://schemas.microsoft.com/office/mac/drawingml/2011/main" val="1"/>
+              <ma14:placeholderFlag xmlns:ma14="http://schemas.microsoft.com/office/mac/drawingml/2011/main" xmlns="" val="1"/>
             </a:ext>
           </a:extLst>
         </p:spPr>
@@ -1681,14 +1681,14 @@
           <a:effectLst/>
           <a:extLst>
             <a:ext uri="{909E8E84-426E-40dd-AFC4-6F175D3DCCD1}">
-              <a14:hiddenFill xmlns="" xmlns:a14="http://schemas.microsoft.com/office/drawing/2010/main">
+              <a14:hiddenFill xmlns:a14="http://schemas.microsoft.com/office/drawing/2010/main" xmlns="">
                 <a:solidFill>
                   <a:schemeClr val="accent1"/>
                 </a:solidFill>
               </a14:hiddenFill>
             </a:ext>
             <a:ext uri="{91240B29-F687-4f45-9708-019B960494DF}">
-              <a14:hiddenLine xmlns="" xmlns:a14="http://schemas.microsoft.com/office/drawing/2010/main" w="9525">
+              <a14:hiddenLine xmlns:a14="http://schemas.microsoft.com/office/drawing/2010/main" xmlns="" w="9525">
                 <a:solidFill>
                   <a:schemeClr val="tx1"/>
                 </a:solidFill>
@@ -1698,7 +1698,7 @@
               </a14:hiddenLine>
             </a:ext>
             <a:ext uri="{AF507438-7753-43e0-B8FC-AC1667EBCBE1}">
-              <a14:hiddenEffects xmlns="" xmlns:a14="http://schemas.microsoft.com/office/drawing/2010/main">
+              <a14:hiddenEffects xmlns:a14="http://schemas.microsoft.com/office/drawing/2010/main" xmlns="">
                 <a:effectLst>
                   <a:outerShdw blurRad="63500" dist="38099" dir="2700000" algn="ctr" rotWithShape="0">
                     <a:schemeClr val="bg2">
@@ -1709,7 +1709,7 @@
               </a14:hiddenEffects>
             </a:ext>
             <a:ext uri="{FAA26D3D-D897-4be2-8F04-BA451C77F1D7}">
-              <ma14:placeholderFlag xmlns="" xmlns:ma14="http://schemas.microsoft.com/office/mac/drawingml/2011/main" val="1"/>
+              <ma14:placeholderFlag xmlns:ma14="http://schemas.microsoft.com/office/mac/drawingml/2011/main" xmlns="" val="1"/>
             </a:ext>
           </a:extLst>
         </p:spPr>
@@ -1754,14 +1754,14 @@
           <a:effectLst/>
           <a:extLst>
             <a:ext uri="{909E8E84-426E-40dd-AFC4-6F175D3DCCD1}">
-              <a14:hiddenFill xmlns="" xmlns:a14="http://schemas.microsoft.com/office/drawing/2010/main">
+              <a14:hiddenFill xmlns:a14="http://schemas.microsoft.com/office/drawing/2010/main" xmlns="">
                 <a:solidFill>
                   <a:schemeClr val="accent1"/>
                 </a:solidFill>
               </a14:hiddenFill>
             </a:ext>
             <a:ext uri="{91240B29-F687-4f45-9708-019B960494DF}">
-              <a14:hiddenLine xmlns="" xmlns:a14="http://schemas.microsoft.com/office/drawing/2010/main" w="9525">
+              <a14:hiddenLine xmlns:a14="http://schemas.microsoft.com/office/drawing/2010/main" xmlns="" w="9525">
                 <a:solidFill>
                   <a:schemeClr val="tx1"/>
                 </a:solidFill>
@@ -1771,7 +1771,7 @@
               </a14:hiddenLine>
             </a:ext>
             <a:ext uri="{AF507438-7753-43e0-B8FC-AC1667EBCBE1}">
-              <a14:hiddenEffects xmlns="" xmlns:a14="http://schemas.microsoft.com/office/drawing/2010/main">
+              <a14:hiddenEffects xmlns:a14="http://schemas.microsoft.com/office/drawing/2010/main" xmlns="">
                 <a:effectLst>
                   <a:outerShdw blurRad="63500" dist="38099" dir="2700000" algn="ctr" rotWithShape="0">
                     <a:schemeClr val="bg2">
@@ -1782,7 +1782,7 @@
               </a14:hiddenEffects>
             </a:ext>
             <a:ext uri="{FAA26D3D-D897-4be2-8F04-BA451C77F1D7}">
-              <ma14:placeholderFlag xmlns="" xmlns:ma14="http://schemas.microsoft.com/office/mac/drawingml/2011/main" val="1"/>
+              <ma14:placeholderFlag xmlns:ma14="http://schemas.microsoft.com/office/mac/drawingml/2011/main" xmlns="" val="1"/>
             </a:ext>
           </a:extLst>
         </p:spPr>
@@ -1827,14 +1827,14 @@
           <a:effectLst/>
           <a:extLst>
             <a:ext uri="{909E8E84-426E-40dd-AFC4-6F175D3DCCD1}">
-              <a14:hiddenFill xmlns="" xmlns:a14="http://schemas.microsoft.com/office/drawing/2010/main">
+              <a14:hiddenFill xmlns:a14="http://schemas.microsoft.com/office/drawing/2010/main" xmlns="">
                 <a:solidFill>
                   <a:schemeClr val="accent1"/>
                 </a:solidFill>
               </a14:hiddenFill>
             </a:ext>
             <a:ext uri="{91240B29-F687-4f45-9708-019B960494DF}">
-              <a14:hiddenLine xmlns="" xmlns:a14="http://schemas.microsoft.com/office/drawing/2010/main" w="9525">
+              <a14:hiddenLine xmlns:a14="http://schemas.microsoft.com/office/drawing/2010/main" xmlns="" w="9525">
                 <a:solidFill>
                   <a:schemeClr val="tx1"/>
                 </a:solidFill>
@@ -1844,7 +1844,7 @@
               </a14:hiddenLine>
             </a:ext>
             <a:ext uri="{AF507438-7753-43e0-B8FC-AC1667EBCBE1}">
-              <a14:hiddenEffects xmlns="" xmlns:a14="http://schemas.microsoft.com/office/drawing/2010/main">
+              <a14:hiddenEffects xmlns:a14="http://schemas.microsoft.com/office/drawing/2010/main" xmlns="">
                 <a:effectLst>
                   <a:outerShdw blurRad="63500" dist="38099" dir="2700000" algn="ctr" rotWithShape="0">
                     <a:schemeClr val="bg2">
@@ -1855,7 +1855,7 @@
               </a14:hiddenEffects>
             </a:ext>
             <a:ext uri="{FAA26D3D-D897-4be2-8F04-BA451C77F1D7}">
-              <ma14:placeholderFlag xmlns="" xmlns:ma14="http://schemas.microsoft.com/office/mac/drawingml/2011/main" val="1"/>
+              <ma14:placeholderFlag xmlns:ma14="http://schemas.microsoft.com/office/mac/drawingml/2011/main" xmlns="" val="1"/>
             </a:ext>
           </a:extLst>
         </p:spPr>
@@ -1941,14 +1941,14 @@
           <a:effectLst/>
           <a:extLst>
             <a:ext uri="{909E8E84-426E-40dd-AFC4-6F175D3DCCD1}">
-              <a14:hiddenFill xmlns="" xmlns:a14="http://schemas.microsoft.com/office/drawing/2010/main">
+              <a14:hiddenFill xmlns:a14="http://schemas.microsoft.com/office/drawing/2010/main" xmlns="">
                 <a:solidFill>
                   <a:schemeClr val="accent1"/>
                 </a:solidFill>
               </a14:hiddenFill>
             </a:ext>
             <a:ext uri="{91240B29-F687-4f45-9708-019B960494DF}">
-              <a14:hiddenLine xmlns="" xmlns:a14="http://schemas.microsoft.com/office/drawing/2010/main" w="9525">
+              <a14:hiddenLine xmlns:a14="http://schemas.microsoft.com/office/drawing/2010/main" xmlns="" w="9525">
                 <a:solidFill>
                   <a:schemeClr val="tx1"/>
                 </a:solidFill>
@@ -1958,7 +1958,7 @@
               </a14:hiddenLine>
             </a:ext>
             <a:ext uri="{AF507438-7753-43e0-B8FC-AC1667EBCBE1}">
-              <a14:hiddenEffects xmlns="" xmlns:a14="http://schemas.microsoft.com/office/drawing/2010/main">
+              <a14:hiddenEffects xmlns:a14="http://schemas.microsoft.com/office/drawing/2010/main" xmlns="">
                 <a:effectLst>
                   <a:outerShdw blurRad="63500" dist="38099" dir="2700000" algn="ctr" rotWithShape="0">
                     <a:schemeClr val="bg2">
@@ -1969,7 +1969,7 @@
               </a14:hiddenEffects>
             </a:ext>
             <a:ext uri="{FAA26D3D-D897-4be2-8F04-BA451C77F1D7}">
-              <ma14:placeholderFlag xmlns="" xmlns:ma14="http://schemas.microsoft.com/office/mac/drawingml/2011/main" val="1"/>
+              <ma14:placeholderFlag xmlns:ma14="http://schemas.microsoft.com/office/mac/drawingml/2011/main" xmlns="" val="1"/>
             </a:ext>
           </a:extLst>
         </p:spPr>
@@ -2014,14 +2014,14 @@
           <a:effectLst/>
           <a:extLst>
             <a:ext uri="{909E8E84-426E-40dd-AFC4-6F175D3DCCD1}">
-              <a14:hiddenFill xmlns="" xmlns:a14="http://schemas.microsoft.com/office/drawing/2010/main">
+              <a14:hiddenFill xmlns:a14="http://schemas.microsoft.com/office/drawing/2010/main" xmlns="">
                 <a:solidFill>
                   <a:schemeClr val="accent1"/>
                 </a:solidFill>
               </a14:hiddenFill>
             </a:ext>
             <a:ext uri="{91240B29-F687-4f45-9708-019B960494DF}">
-              <a14:hiddenLine xmlns="" xmlns:a14="http://schemas.microsoft.com/office/drawing/2010/main" w="9525">
+              <a14:hiddenLine xmlns:a14="http://schemas.microsoft.com/office/drawing/2010/main" xmlns="" w="9525">
                 <a:solidFill>
                   <a:schemeClr val="tx1"/>
                 </a:solidFill>
@@ -2031,7 +2031,7 @@
               </a14:hiddenLine>
             </a:ext>
             <a:ext uri="{AF507438-7753-43e0-B8FC-AC1667EBCBE1}">
-              <a14:hiddenEffects xmlns="" xmlns:a14="http://schemas.microsoft.com/office/drawing/2010/main">
+              <a14:hiddenEffects xmlns:a14="http://schemas.microsoft.com/office/drawing/2010/main" xmlns="">
                 <a:effectLst>
                   <a:outerShdw blurRad="63500" dist="38099" dir="2700000" algn="ctr" rotWithShape="0">
                     <a:schemeClr val="bg2">
@@ -2042,7 +2042,7 @@
               </a14:hiddenEffects>
             </a:ext>
             <a:ext uri="{FAA26D3D-D897-4be2-8F04-BA451C77F1D7}">
-              <ma14:placeholderFlag xmlns="" xmlns:ma14="http://schemas.microsoft.com/office/mac/drawingml/2011/main" val="1"/>
+              <ma14:placeholderFlag xmlns:ma14="http://schemas.microsoft.com/office/mac/drawingml/2011/main" xmlns="" val="1"/>
             </a:ext>
           </a:extLst>
         </p:spPr>
@@ -2092,7 +2092,7 @@
           <a:effectLst/>
           <a:extLst>
             <a:ext uri="{AF507438-7753-43e0-B8FC-AC1667EBCBE1}">
-              <a14:hiddenEffects xmlns="" xmlns:a14="http://schemas.microsoft.com/office/drawing/2010/main">
+              <a14:hiddenEffects xmlns:a14="http://schemas.microsoft.com/office/drawing/2010/main" xmlns="">
                 <a:effectLst>
                   <a:outerShdw blurRad="63500" dist="38099" dir="2700000" algn="ctr" rotWithShape="0">
                     <a:srgbClr val="000000">
@@ -2103,7 +2103,7 @@
               </a14:hiddenEffects>
             </a:ext>
             <a:ext uri="{53640926-AAD7-44d8-BBD7-CCE9431645EC}">
-              <a14:shadowObscured xmlns="" xmlns:a14="http://schemas.microsoft.com/office/drawing/2010/main" val="1"/>
+              <a14:shadowObscured xmlns:a14="http://schemas.microsoft.com/office/drawing/2010/main" xmlns="" val="1"/>
             </a:ext>
           </a:extLst>
         </p:spPr>
@@ -2133,14 +2133,14 @@
           <a:effectLst/>
           <a:extLst>
             <a:ext uri="{909E8E84-426E-40dd-AFC4-6F175D3DCCD1}">
-              <a14:hiddenFill xmlns="" xmlns:a14="http://schemas.microsoft.com/office/drawing/2010/main">
+              <a14:hiddenFill xmlns:a14="http://schemas.microsoft.com/office/drawing/2010/main" xmlns="">
                 <a:solidFill>
                   <a:schemeClr val="accent1"/>
                 </a:solidFill>
               </a14:hiddenFill>
             </a:ext>
             <a:ext uri="{91240B29-F687-4f45-9708-019B960494DF}">
-              <a14:hiddenLine xmlns="" xmlns:a14="http://schemas.microsoft.com/office/drawing/2010/main" w="9525">
+              <a14:hiddenLine xmlns:a14="http://schemas.microsoft.com/office/drawing/2010/main" xmlns="" w="9525">
                 <a:solidFill>
                   <a:schemeClr val="tx1"/>
                 </a:solidFill>
@@ -2150,7 +2150,7 @@
               </a14:hiddenLine>
             </a:ext>
             <a:ext uri="{AF507438-7753-43e0-B8FC-AC1667EBCBE1}">
-              <a14:hiddenEffects xmlns="" xmlns:a14="http://schemas.microsoft.com/office/drawing/2010/main">
+              <a14:hiddenEffects xmlns:a14="http://schemas.microsoft.com/office/drawing/2010/main" xmlns="">
                 <a:effectLst>
                   <a:outerShdw blurRad="63500" dist="38099" dir="2700000" algn="ctr" rotWithShape="0">
                     <a:schemeClr val="bg2">
@@ -2161,7 +2161,7 @@
               </a14:hiddenEffects>
             </a:ext>
             <a:ext uri="{FAA26D3D-D897-4be2-8F04-BA451C77F1D7}">
-              <ma14:placeholderFlag xmlns="" xmlns:ma14="http://schemas.microsoft.com/office/mac/drawingml/2011/main" val="1"/>
+              <ma14:placeholderFlag xmlns:ma14="http://schemas.microsoft.com/office/mac/drawingml/2011/main" xmlns="" val="1"/>
             </a:ext>
           </a:extLst>
         </p:spPr>
@@ -2234,14 +2234,14 @@
           <a:effectLst/>
           <a:extLst>
             <a:ext uri="{909E8E84-426E-40dd-AFC4-6F175D3DCCD1}">
-              <a14:hiddenFill xmlns="" xmlns:a14="http://schemas.microsoft.com/office/drawing/2010/main">
+              <a14:hiddenFill xmlns:a14="http://schemas.microsoft.com/office/drawing/2010/main" xmlns="">
                 <a:solidFill>
                   <a:schemeClr val="accent1"/>
                 </a:solidFill>
               </a14:hiddenFill>
             </a:ext>
             <a:ext uri="{91240B29-F687-4f45-9708-019B960494DF}">
-              <a14:hiddenLine xmlns="" xmlns:a14="http://schemas.microsoft.com/office/drawing/2010/main" w="9525">
+              <a14:hiddenLine xmlns:a14="http://schemas.microsoft.com/office/drawing/2010/main" xmlns="" w="9525">
                 <a:solidFill>
                   <a:schemeClr val="tx1"/>
                 </a:solidFill>
@@ -2251,7 +2251,7 @@
               </a14:hiddenLine>
             </a:ext>
             <a:ext uri="{AF507438-7753-43e0-B8FC-AC1667EBCBE1}">
-              <a14:hiddenEffects xmlns="" xmlns:a14="http://schemas.microsoft.com/office/drawing/2010/main">
+              <a14:hiddenEffects xmlns:a14="http://schemas.microsoft.com/office/drawing/2010/main" xmlns="">
                 <a:effectLst>
                   <a:outerShdw blurRad="63500" dist="38099" dir="2700000" algn="ctr" rotWithShape="0">
                     <a:schemeClr val="bg2">
@@ -2262,7 +2262,7 @@
               </a14:hiddenEffects>
             </a:ext>
             <a:ext uri="{FAA26D3D-D897-4be2-8F04-BA451C77F1D7}">
-              <ma14:placeholderFlag xmlns="" xmlns:ma14="http://schemas.microsoft.com/office/mac/drawingml/2011/main" val="1"/>
+              <ma14:placeholderFlag xmlns:ma14="http://schemas.microsoft.com/office/mac/drawingml/2011/main" xmlns="" val="1"/>
             </a:ext>
           </a:extLst>
         </p:spPr>
@@ -2307,14 +2307,14 @@
           <a:effectLst/>
           <a:extLst>
             <a:ext uri="{909E8E84-426E-40dd-AFC4-6F175D3DCCD1}">
-              <a14:hiddenFill xmlns="" xmlns:a14="http://schemas.microsoft.com/office/drawing/2010/main">
+              <a14:hiddenFill xmlns:a14="http://schemas.microsoft.com/office/drawing/2010/main" xmlns="">
                 <a:solidFill>
                   <a:schemeClr val="accent1"/>
                 </a:solidFill>
               </a14:hiddenFill>
             </a:ext>
             <a:ext uri="{91240B29-F687-4f45-9708-019B960494DF}">
-              <a14:hiddenLine xmlns="" xmlns:a14="http://schemas.microsoft.com/office/drawing/2010/main" w="9525">
+              <a14:hiddenLine xmlns:a14="http://schemas.microsoft.com/office/drawing/2010/main" xmlns="" w="9525">
                 <a:solidFill>
                   <a:schemeClr val="tx1"/>
                 </a:solidFill>
@@ -2324,7 +2324,7 @@
               </a14:hiddenLine>
             </a:ext>
             <a:ext uri="{AF507438-7753-43e0-B8FC-AC1667EBCBE1}">
-              <a14:hiddenEffects xmlns="" xmlns:a14="http://schemas.microsoft.com/office/drawing/2010/main">
+              <a14:hiddenEffects xmlns:a14="http://schemas.microsoft.com/office/drawing/2010/main" xmlns="">
                 <a:effectLst>
                   <a:outerShdw blurRad="63500" dist="38099" dir="2700000" algn="ctr" rotWithShape="0">
                     <a:schemeClr val="bg2">
@@ -2335,7 +2335,7 @@
               </a14:hiddenEffects>
             </a:ext>
             <a:ext uri="{FAA26D3D-D897-4be2-8F04-BA451C77F1D7}">
-              <ma14:placeholderFlag xmlns="" xmlns:ma14="http://schemas.microsoft.com/office/mac/drawingml/2011/main" val="1"/>
+              <ma14:placeholderFlag xmlns:ma14="http://schemas.microsoft.com/office/mac/drawingml/2011/main" xmlns="" val="1"/>
             </a:ext>
           </a:extLst>
         </p:spPr>
@@ -2624,7 +2624,7 @@
           <a:p>
             <a:fld id="{C764DE79-268F-4C1A-8933-263129D2AF90}" type="datetimeFigureOut">
               <a:rPr lang="en-US" smtClean="0"/>
-              <a:t>8/29/2024</a:t>
+              <a:t>9/28/2024</a:t>
             </a:fld>
             <a:endParaRPr lang="en-US" dirty="0"/>
           </a:p>
@@ -2794,7 +2794,7 @@
           <a:p>
             <a:fld id="{C764DE79-268F-4C1A-8933-263129D2AF90}" type="datetimeFigureOut">
               <a:rPr lang="en-US" smtClean="0"/>
-              <a:t>8/29/2024</a:t>
+              <a:t>9/28/2024</a:t>
             </a:fld>
             <a:endParaRPr lang="en-US" dirty="0"/>
           </a:p>
@@ -2974,7 +2974,7 @@
           <a:p>
             <a:fld id="{C764DE79-268F-4C1A-8933-263129D2AF90}" type="datetimeFigureOut">
               <a:rPr lang="en-US" smtClean="0"/>
-              <a:t>8/29/2024</a:t>
+              <a:t>9/28/2024</a:t>
             </a:fld>
             <a:endParaRPr lang="en-US" dirty="0"/>
           </a:p>
@@ -3144,7 +3144,7 @@
           <a:p>
             <a:fld id="{C764DE79-268F-4C1A-8933-263129D2AF90}" type="datetimeFigureOut">
               <a:rPr lang="en-US" smtClean="0"/>
-              <a:t>8/29/2024</a:t>
+              <a:t>9/28/2024</a:t>
             </a:fld>
             <a:endParaRPr lang="en-US" dirty="0"/>
           </a:p>
@@ -3388,7 +3388,7 @@
           <a:p>
             <a:fld id="{C764DE79-268F-4C1A-8933-263129D2AF90}" type="datetimeFigureOut">
               <a:rPr lang="en-US" smtClean="0"/>
-              <a:t>8/29/2024</a:t>
+              <a:t>9/28/2024</a:t>
             </a:fld>
             <a:endParaRPr lang="en-US" dirty="0"/>
           </a:p>
@@ -3621,7 +3621,7 @@
           <a:p>
             <a:fld id="{C764DE79-268F-4C1A-8933-263129D2AF90}" type="datetimeFigureOut">
               <a:rPr lang="en-US" smtClean="0"/>
-              <a:t>8/29/2024</a:t>
+              <a:t>9/28/2024</a:t>
             </a:fld>
             <a:endParaRPr lang="en-US" dirty="0"/>
           </a:p>
@@ -3988,7 +3988,7 @@
           <a:p>
             <a:fld id="{C764DE79-268F-4C1A-8933-263129D2AF90}" type="datetimeFigureOut">
               <a:rPr lang="en-US" smtClean="0"/>
-              <a:t>8/29/2024</a:t>
+              <a:t>9/28/2024</a:t>
             </a:fld>
             <a:endParaRPr lang="en-US" dirty="0"/>
           </a:p>
@@ -4106,7 +4106,7 @@
           <a:p>
             <a:fld id="{C764DE79-268F-4C1A-8933-263129D2AF90}" type="datetimeFigureOut">
               <a:rPr lang="en-US" smtClean="0"/>
-              <a:t>8/29/2024</a:t>
+              <a:t>9/28/2024</a:t>
             </a:fld>
             <a:endParaRPr lang="en-US" dirty="0"/>
           </a:p>
@@ -4635,7 +4635,7 @@
           <a:p>
             <a:fld id="{C764DE79-268F-4C1A-8933-263129D2AF90}" type="datetimeFigureOut">
               <a:rPr lang="en-US" smtClean="0"/>
-              <a:t>8/29/2024</a:t>
+              <a:t>9/28/2024</a:t>
             </a:fld>
             <a:endParaRPr lang="en-US" dirty="0"/>
           </a:p>
@@ -4892,7 +4892,7 @@
           <a:p>
             <a:fld id="{C764DE79-268F-4C1A-8933-263129D2AF90}" type="datetimeFigureOut">
               <a:rPr lang="en-US" smtClean="0"/>
-              <a:t>8/29/2024</a:t>
+              <a:t>9/28/2024</a:t>
             </a:fld>
             <a:endParaRPr lang="en-US" dirty="0"/>
           </a:p>
@@ -5167,7 +5167,7 @@
           <a:p>
             <a:fld id="{C764DE79-268F-4C1A-8933-263129D2AF90}" type="datetimeFigureOut">
               <a:rPr lang="en-US" smtClean="0"/>
-              <a:t>8/29/2024</a:t>
+              <a:t>9/28/2024</a:t>
             </a:fld>
             <a:endParaRPr lang="en-US" dirty="0"/>
           </a:p>
@@ -11340,6 +11340,58 @@
           </a:p>
         </p:txBody>
       </p:sp>
+      <p:cxnSp>
+        <p:nvCxnSpPr>
+          <p:cNvPr id="2" name="Connecteur : en angle 1">
+            <a:extLst>
+              <a:ext uri="{FF2B5EF4-FFF2-40B4-BE49-F238E27FC236}">
+                <a16:creationId xmlns:a16="http://schemas.microsoft.com/office/drawing/2014/main" id="{10D0580D-3F92-03DE-00E4-56B23D55CDE9}"/>
+              </a:ext>
+            </a:extLst>
+          </p:cNvPr>
+          <p:cNvCxnSpPr>
+            <a:cxnSpLocks/>
+            <a:stCxn id="79" idx="3"/>
+            <a:endCxn id="133" idx="1"/>
+          </p:cNvCxnSpPr>
+          <p:nvPr/>
+        </p:nvCxnSpPr>
+        <p:spPr>
+          <a:xfrm flipV="1">
+            <a:off x="3046770" y="5909170"/>
+            <a:ext cx="616446" cy="242084"/>
+          </a:xfrm>
+          <a:prstGeom prst="bentConnector3">
+            <a:avLst>
+              <a:gd name="adj1" fmla="val 50000"/>
+            </a:avLst>
+          </a:prstGeom>
+          <a:ln>
+            <a:tailEnd type="triangle"/>
+          </a:ln>
+          <a:effectLst>
+            <a:outerShdw blurRad="50800" dist="38100" dir="2700000" algn="tl" rotWithShape="0">
+              <a:prstClr val="black">
+                <a:alpha val="40000"/>
+              </a:prstClr>
+            </a:outerShdw>
+          </a:effectLst>
+        </p:spPr>
+        <p:style>
+          <a:lnRef idx="3">
+            <a:schemeClr val="accent1"/>
+          </a:lnRef>
+          <a:fillRef idx="0">
+            <a:schemeClr val="accent1"/>
+          </a:fillRef>
+          <a:effectRef idx="2">
+            <a:schemeClr val="accent1"/>
+          </a:effectRef>
+          <a:fontRef idx="minor">
+            <a:schemeClr val="tx1"/>
+          </a:fontRef>
+        </p:style>
+      </p:cxnSp>
     </p:spTree>
     <p:extLst>
       <p:ext uri="{BB962C8B-B14F-4D97-AF65-F5344CB8AC3E}">
@@ -11459,7 +11511,7 @@
         </p:nvSpPr>
         <p:spPr>
           <a:xfrm>
-            <a:off x="1242645" y="7837514"/>
+            <a:off x="1276380" y="7837514"/>
             <a:ext cx="5573667" cy="1902203"/>
           </a:xfrm>
           <a:prstGeom prst="rect">
@@ -11607,7 +11659,7 @@
         </p:blipFill>
         <p:spPr>
           <a:xfrm>
-            <a:off x="1052736" y="5344850"/>
+            <a:off x="1080132" y="5344850"/>
             <a:ext cx="5661236" cy="2272446"/>
           </a:xfrm>
           <a:prstGeom prst="rect">
@@ -11629,8 +11681,8 @@
         </p:nvSpPr>
         <p:spPr>
           <a:xfrm>
-            <a:off x="44624" y="6252594"/>
-            <a:ext cx="1495922" cy="369332"/>
+            <a:off x="-38102" y="6100364"/>
+            <a:ext cx="1844826" cy="646331"/>
           </a:xfrm>
           <a:prstGeom prst="rect">
             <a:avLst/>
@@ -11638,14 +11690,14 @@
           <a:noFill/>
         </p:spPr>
         <p:txBody>
-          <a:bodyPr wrap="none" rtlCol="0">
+          <a:bodyPr wrap="square" rtlCol="0">
             <a:spAutoFit/>
           </a:bodyPr>
           <a:lstStyle/>
           <a:p>
             <a:r>
               <a:rPr lang="fr-FR" dirty="0"/>
-              <a:t>Boucle </a:t>
+              <a:t>Boucle non bornée - </a:t>
             </a:r>
             <a:r>
               <a:rPr lang="fr-FR" dirty="0" err="1"/>
@@ -11988,7 +12040,14 @@
             </a:pPr>
             <a:r>
               <a:rPr lang="fr-FR" sz="1000" dirty="0"/>
-              <a:t>Les égalités / inégalités mathématiques forment des expressions booléennes : ( ==, !=, &lt;, &gt;, &lt;=, &gt;= ) </a:t>
+              <a:t>Les égalités / inégalités mathématiques forment des expressions booléennes : </a:t>
+            </a:r>
+            <a:br>
+              <a:rPr lang="fr-FR" sz="1000" dirty="0"/>
+            </a:br>
+            <a:r>
+              <a:rPr lang="fr-FR" sz="1000" dirty="0"/>
+              <a:t>( ==, !=, &lt;, &gt;, &lt;=, &gt;= ) </a:t>
             </a:r>
           </a:p>
         </p:txBody>
@@ -12553,8 +12612,8 @@
         </p:nvSpPr>
         <p:spPr>
           <a:xfrm>
-            <a:off x="40973" y="8784421"/>
-            <a:ext cx="1255408" cy="369332"/>
+            <a:off x="0" y="8734290"/>
+            <a:ext cx="1440880" cy="584775"/>
           </a:xfrm>
           <a:prstGeom prst="rect">
             <a:avLst/>
@@ -12562,14 +12621,21 @@
           <a:noFill/>
         </p:spPr>
         <p:txBody>
-          <a:bodyPr wrap="none" rtlCol="0">
+          <a:bodyPr wrap="square" rtlCol="0">
             <a:spAutoFit/>
           </a:bodyPr>
           <a:lstStyle/>
           <a:p>
             <a:r>
-              <a:rPr lang="fr-FR" dirty="0"/>
-              <a:t>Boucle for :</a:t>
+              <a:rPr lang="fr-FR" sz="1600" dirty="0"/>
+              <a:t>Boucle </a:t>
+            </a:r>
+            <a:br>
+              <a:rPr lang="fr-FR" sz="1600" dirty="0"/>
+            </a:br>
+            <a:r>
+              <a:rPr lang="fr-FR" sz="1600" dirty="0"/>
+              <a:t>bornée - for :</a:t>
             </a:r>
           </a:p>
         </p:txBody>
@@ -12626,7 +12692,7 @@
         </p:blipFill>
         <p:spPr>
           <a:xfrm>
-            <a:off x="695395" y="7905328"/>
+            <a:off x="692696" y="7925140"/>
             <a:ext cx="6117981" cy="1830195"/>
           </a:xfrm>
           <a:prstGeom prst="rect">

</xml_diff>